<commit_message>
Evaluation and description of the organisational
structure
</commit_message>
<xml_diff>
--- a/1.Final semester PROJECT/Business/SWOT.pptx
+++ b/1.Final semester PROJECT/Business/SWOT.pptx
@@ -243,7 +243,7 @@
           <a:p>
             <a:fld id="{604075D6-09F9-4CD9-AD7B-537C8F4C460B}" type="datetimeFigureOut">
               <a:rPr lang="en-US" smtClean="0"/>
-              <a:t>24-Apr-15</a:t>
+              <a:t>27-Apr-15</a:t>
             </a:fld>
             <a:endParaRPr lang="en-US"/>
           </a:p>
@@ -413,7 +413,7 @@
           <a:p>
             <a:fld id="{604075D6-09F9-4CD9-AD7B-537C8F4C460B}" type="datetimeFigureOut">
               <a:rPr lang="en-US" smtClean="0"/>
-              <a:t>24-Apr-15</a:t>
+              <a:t>27-Apr-15</a:t>
             </a:fld>
             <a:endParaRPr lang="en-US"/>
           </a:p>
@@ -593,7 +593,7 @@
           <a:p>
             <a:fld id="{604075D6-09F9-4CD9-AD7B-537C8F4C460B}" type="datetimeFigureOut">
               <a:rPr lang="en-US" smtClean="0"/>
-              <a:t>24-Apr-15</a:t>
+              <a:t>27-Apr-15</a:t>
             </a:fld>
             <a:endParaRPr lang="en-US"/>
           </a:p>
@@ -763,7 +763,7 @@
           <a:p>
             <a:fld id="{604075D6-09F9-4CD9-AD7B-537C8F4C460B}" type="datetimeFigureOut">
               <a:rPr lang="en-US" smtClean="0"/>
-              <a:t>24-Apr-15</a:t>
+              <a:t>27-Apr-15</a:t>
             </a:fld>
             <a:endParaRPr lang="en-US"/>
           </a:p>
@@ -1009,7 +1009,7 @@
           <a:p>
             <a:fld id="{604075D6-09F9-4CD9-AD7B-537C8F4C460B}" type="datetimeFigureOut">
               <a:rPr lang="en-US" smtClean="0"/>
-              <a:t>24-Apr-15</a:t>
+              <a:t>27-Apr-15</a:t>
             </a:fld>
             <a:endParaRPr lang="en-US"/>
           </a:p>
@@ -1241,7 +1241,7 @@
           <a:p>
             <a:fld id="{604075D6-09F9-4CD9-AD7B-537C8F4C460B}" type="datetimeFigureOut">
               <a:rPr lang="en-US" smtClean="0"/>
-              <a:t>24-Apr-15</a:t>
+              <a:t>27-Apr-15</a:t>
             </a:fld>
             <a:endParaRPr lang="en-US"/>
           </a:p>
@@ -1608,7 +1608,7 @@
           <a:p>
             <a:fld id="{604075D6-09F9-4CD9-AD7B-537C8F4C460B}" type="datetimeFigureOut">
               <a:rPr lang="en-US" smtClean="0"/>
-              <a:t>24-Apr-15</a:t>
+              <a:t>27-Apr-15</a:t>
             </a:fld>
             <a:endParaRPr lang="en-US"/>
           </a:p>
@@ -1726,7 +1726,7 @@
           <a:p>
             <a:fld id="{604075D6-09F9-4CD9-AD7B-537C8F4C460B}" type="datetimeFigureOut">
               <a:rPr lang="en-US" smtClean="0"/>
-              <a:t>24-Apr-15</a:t>
+              <a:t>27-Apr-15</a:t>
             </a:fld>
             <a:endParaRPr lang="en-US"/>
           </a:p>
@@ -1821,7 +1821,7 @@
           <a:p>
             <a:fld id="{604075D6-09F9-4CD9-AD7B-537C8F4C460B}" type="datetimeFigureOut">
               <a:rPr lang="en-US" smtClean="0"/>
-              <a:t>24-Apr-15</a:t>
+              <a:t>27-Apr-15</a:t>
             </a:fld>
             <a:endParaRPr lang="en-US"/>
           </a:p>
@@ -2098,7 +2098,7 @@
           <a:p>
             <a:fld id="{604075D6-09F9-4CD9-AD7B-537C8F4C460B}" type="datetimeFigureOut">
               <a:rPr lang="en-US" smtClean="0"/>
-              <a:t>24-Apr-15</a:t>
+              <a:t>27-Apr-15</a:t>
             </a:fld>
             <a:endParaRPr lang="en-US"/>
           </a:p>
@@ -2351,7 +2351,7 @@
           <a:p>
             <a:fld id="{604075D6-09F9-4CD9-AD7B-537C8F4C460B}" type="datetimeFigureOut">
               <a:rPr lang="en-US" smtClean="0"/>
-              <a:t>24-Apr-15</a:t>
+              <a:t>27-Apr-15</a:t>
             </a:fld>
             <a:endParaRPr lang="en-US"/>
           </a:p>
@@ -2564,7 +2564,7 @@
           <a:p>
             <a:fld id="{604075D6-09F9-4CD9-AD7B-537C8F4C460B}" type="datetimeFigureOut">
               <a:rPr lang="en-US" smtClean="0"/>
-              <a:t>24-Apr-15</a:t>
+              <a:t>27-Apr-15</a:t>
             </a:fld>
             <a:endParaRPr lang="en-US"/>
           </a:p>
@@ -3254,19 +3254,7 @@
               <a:rPr lang="en-US" dirty="0" smtClean="0">
                 <a:latin typeface="Arial Black" panose="020B0A04020102020204" pitchFamily="34" charset="0"/>
               </a:rPr>
-              <a:t>What </a:t>
-            </a:r>
-            <a:r>
-              <a:rPr lang="en-US" dirty="0" smtClean="0">
-                <a:latin typeface="Arial Black" panose="020B0A04020102020204" pitchFamily="34" charset="0"/>
-              </a:rPr>
-              <a:t>are out opportunities</a:t>
-            </a:r>
-            <a:r>
-              <a:rPr lang="en-US" dirty="0" smtClean="0">
-                <a:latin typeface="Arial Black" panose="020B0A04020102020204" pitchFamily="34" charset="0"/>
-              </a:rPr>
-              <a:t>?</a:t>
+              <a:t>What are out opportunities?</a:t>
             </a:r>
           </a:p>
           <a:p>
@@ -3378,13 +3366,7 @@
               <a:rPr lang="en-US" dirty="0" smtClean="0">
                 <a:latin typeface="Arial Black" panose="020B0A04020102020204" pitchFamily="34" charset="0"/>
               </a:rPr>
-              <a:t>What are our weaknesses</a:t>
-            </a:r>
-            <a:r>
-              <a:rPr lang="en-US" dirty="0" smtClean="0">
-                <a:latin typeface="Arial Black" panose="020B0A04020102020204" pitchFamily="34" charset="0"/>
-              </a:rPr>
-              <a:t>?</a:t>
+              <a:t>What are our weaknesses?</a:t>
             </a:r>
           </a:p>
           <a:p>
@@ -3399,10 +3381,6 @@
               </a:rPr>
               <a:t>No track of current customers    </a:t>
             </a:r>
-            <a:endParaRPr lang="en-US" sz="1600" dirty="0" smtClean="0">
-              <a:latin typeface="Times New Roman" panose="02020603050405020304" pitchFamily="18" charset="0"/>
-              <a:cs typeface="Times New Roman" panose="02020603050405020304" pitchFamily="18" charset="0"/>
-            </a:endParaRPr>
           </a:p>
           <a:p>
             <a:pPr marL="285750" indent="-285750">
@@ -3427,7 +3405,21 @@
                 <a:latin typeface="Times New Roman" panose="02020603050405020304" pitchFamily="18" charset="0"/>
                 <a:cs typeface="Times New Roman" panose="02020603050405020304" pitchFamily="18" charset="0"/>
               </a:rPr>
-              <a:t>Low number of employees</a:t>
+              <a:t>Lack </a:t>
+            </a:r>
+            <a:r>
+              <a:rPr lang="en-US" sz="1600" dirty="0" smtClean="0">
+                <a:latin typeface="Times New Roman" panose="02020603050405020304" pitchFamily="18" charset="0"/>
+                <a:cs typeface="Times New Roman" panose="02020603050405020304" pitchFamily="18" charset="0"/>
+              </a:rPr>
+              <a:t>of track for available employees for </a:t>
+            </a:r>
+            <a:r>
+              <a:rPr lang="en-US" sz="1600" dirty="0" smtClean="0">
+                <a:latin typeface="Times New Roman" panose="02020603050405020304" pitchFamily="18" charset="0"/>
+                <a:cs typeface="Times New Roman" panose="02020603050405020304" pitchFamily="18" charset="0"/>
+              </a:rPr>
+              <a:t>fieldwork</a:t>
             </a:r>
           </a:p>
           <a:p>
@@ -3435,13 +3427,6 @@
               <a:buFont typeface="Arial" panose="020B0604020202020204" pitchFamily="34" charset="0"/>
               <a:buChar char="•"/>
             </a:pPr>
-            <a:r>
-              <a:rPr lang="en-US" sz="1600" dirty="0" smtClean="0">
-                <a:latin typeface="Times New Roman" panose="02020603050405020304" pitchFamily="18" charset="0"/>
-                <a:cs typeface="Times New Roman" panose="02020603050405020304" pitchFamily="18" charset="0"/>
-              </a:rPr>
-              <a:t>Lack of track for available employees for fieldwork</a:t>
-            </a:r>
             <a:endParaRPr lang="en-US" dirty="0">
               <a:latin typeface="Times New Roman" panose="02020603050405020304" pitchFamily="18" charset="0"/>
               <a:cs typeface="Times New Roman" panose="02020603050405020304" pitchFamily="18" charset="0"/>
@@ -3523,7 +3508,7 @@
                 <a:latin typeface="Times New Roman" panose="02020603050405020304" pitchFamily="18" charset="0"/>
                 <a:cs typeface="Times New Roman" panose="02020603050405020304" pitchFamily="18" charset="0"/>
               </a:rPr>
-              <a:t>Other companies</a:t>
+              <a:t>New competitors</a:t>
             </a:r>
           </a:p>
           <a:p>
@@ -3536,7 +3521,14 @@
                 <a:latin typeface="Times New Roman" panose="02020603050405020304" pitchFamily="18" charset="0"/>
                 <a:cs typeface="Times New Roman" panose="02020603050405020304" pitchFamily="18" charset="0"/>
               </a:rPr>
-              <a:t>Highly competitive market</a:t>
+              <a:t>Highly </a:t>
+            </a:r>
+            <a:r>
+              <a:rPr lang="en-US" sz="1600" dirty="0" smtClean="0">
+                <a:latin typeface="Times New Roman" panose="02020603050405020304" pitchFamily="18" charset="0"/>
+                <a:cs typeface="Times New Roman" panose="02020603050405020304" pitchFamily="18" charset="0"/>
+              </a:rPr>
+              <a:t>competitive market</a:t>
             </a:r>
             <a:endParaRPr lang="en-US" sz="1600" dirty="0">
               <a:latin typeface="Times New Roman" panose="02020603050405020304" pitchFamily="18" charset="0"/>

</xml_diff>